<commit_message>
update Midterm Test 2
</commit_message>
<xml_diff>
--- a/TA Lecture/Computer Programming Mid-term Test 2.pptx
+++ b/TA Lecture/Computer Programming Mid-term Test 2.pptx
@@ -6464,33 +6464,42 @@
               <a:t>[</a:t>
             </a:r>
             <a:r>
-              <a:rPr kumimoji="0" lang="zh-TW" altLang="zh-TW" sz="900" b="0" i="0" u="none" strike="noStrike" cap="none" normalizeH="0" baseline="0" dirty="0">
-                <a:ln>
-                  <a:noFill/>
-                </a:ln>
+              <a:rPr lang="en-US" altLang="zh-TW" sz="900" dirty="0">
                 <a:solidFill>
                   <a:srgbClr val="EEFFFF"/>
                 </a:solidFill>
-                <a:effectLst/>
-                <a:latin typeface="Arial Unicode MS"/>
-                <a:ea typeface="JetBrains Mono"/>
-              </a:rPr>
-              <a:t>semanticWrods</a:t>
-            </a:r>
-            <a:r>
-              <a:rPr kumimoji="0" lang="zh-TW" altLang="zh-TW" sz="900" b="0" i="0" u="none" strike="noStrike" cap="none" normalizeH="0" baseline="0" dirty="0">
-                <a:ln>
-                  <a:noFill/>
-                </a:ln>
-                <a:solidFill>
-                  <a:srgbClr val="89DDFF"/>
-                </a:solidFill>
-                <a:effectLst/>
-                <a:latin typeface="Arial Unicode MS"/>
-                <a:ea typeface="JetBrains Mono"/>
-              </a:rPr>
-              <a:t>.</a:t>
-            </a:r>
+                <a:latin typeface="Arial Unicode MS"/>
+                <a:ea typeface="JetBrains Mono"/>
+              </a:rPr>
+              <a:t>pointer</a:t>
+            </a:r>
+            <a:r>
+              <a:rPr kumimoji="0" lang="zh-TW" altLang="zh-TW" sz="900" b="0" i="0" u="none" strike="noStrike" cap="none" normalizeH="0" baseline="0" dirty="0">
+                <a:ln>
+                  <a:noFill/>
+                </a:ln>
+                <a:solidFill>
+                  <a:srgbClr val="89DDFF"/>
+                </a:solidFill>
+                <a:effectLst/>
+                <a:latin typeface="Arial Unicode MS"/>
+                <a:ea typeface="JetBrains Mono"/>
+              </a:rPr>
+              <a:t>]</a:t>
+            </a:r>
+            <a:br>
+              <a:rPr kumimoji="0" lang="zh-TW" altLang="zh-TW" sz="900" b="0" i="0" u="none" strike="noStrike" cap="none" normalizeH="0" baseline="0" dirty="0">
+                <a:ln>
+                  <a:noFill/>
+                </a:ln>
+                <a:solidFill>
+                  <a:srgbClr val="89DDFF"/>
+                </a:solidFill>
+                <a:effectLst/>
+                <a:latin typeface="Arial Unicode MS"/>
+                <a:ea typeface="JetBrains Mono"/>
+              </a:rPr>
+            </a:br>
             <a:r>
               <a:rPr kumimoji="0" lang="zh-TW" altLang="zh-TW" sz="900" b="0" i="0" u="none" strike="noStrike" cap="none" normalizeH="0" baseline="0" dirty="0">
                 <a:ln>
@@ -6503,35 +6512,22 @@
                 <a:latin typeface="Arial Unicode MS"/>
                 <a:ea typeface="JetBrains Mono"/>
               </a:rPr>
-              <a:t>length</a:t>
-            </a:r>
-            <a:r>
-              <a:rPr kumimoji="0" lang="zh-TW" altLang="zh-TW" sz="900" b="0" i="0" u="none" strike="noStrike" cap="none" normalizeH="0" baseline="0" dirty="0">
-                <a:ln>
-                  <a:noFill/>
-                </a:ln>
-                <a:solidFill>
-                  <a:srgbClr val="89DDFF"/>
-                </a:solidFill>
-                <a:effectLst/>
-                <a:latin typeface="Arial Unicode MS"/>
-                <a:ea typeface="JetBrains Mono"/>
-              </a:rPr>
-              <a:t>]</a:t>
-            </a:r>
-            <a:br>
-              <a:rPr kumimoji="0" lang="zh-TW" altLang="zh-TW" sz="900" b="0" i="0" u="none" strike="noStrike" cap="none" normalizeH="0" baseline="0" dirty="0">
-                <a:ln>
-                  <a:noFill/>
-                </a:ln>
-                <a:solidFill>
-                  <a:srgbClr val="89DDFF"/>
-                </a:solidFill>
-                <a:effectLst/>
-                <a:latin typeface="Arial Unicode MS"/>
-                <a:ea typeface="JetBrains Mono"/>
-              </a:rPr>
-            </a:br>
+              <a:t>freq </a:t>
+            </a:r>
+            <a:r>
+              <a:rPr kumimoji="0" lang="zh-TW" altLang="zh-TW" sz="900" b="0" i="0" u="none" strike="noStrike" cap="none" normalizeH="0" baseline="0" dirty="0">
+                <a:ln>
+                  <a:noFill/>
+                </a:ln>
+                <a:solidFill>
+                  <a:srgbClr val="89DDFF"/>
+                </a:solidFill>
+                <a:effectLst/>
+                <a:latin typeface="Arial Unicode MS"/>
+                <a:ea typeface="JetBrains Mono"/>
+              </a:rPr>
+              <a:t>= </a:t>
+            </a:r>
             <a:r>
               <a:rPr kumimoji="0" lang="zh-TW" altLang="zh-TW" sz="900" b="0" i="0" u="none" strike="noStrike" cap="none" normalizeH="0" baseline="0" dirty="0">
                 <a:ln>
@@ -6544,52 +6540,34 @@
                 <a:latin typeface="Arial Unicode MS"/>
                 <a:ea typeface="JetBrains Mono"/>
               </a:rPr>
-              <a:t>freq </a:t>
-            </a:r>
-            <a:r>
-              <a:rPr kumimoji="0" lang="zh-TW" altLang="zh-TW" sz="900" b="0" i="0" u="none" strike="noStrike" cap="none" normalizeH="0" baseline="0" dirty="0">
-                <a:ln>
-                  <a:noFill/>
-                </a:ln>
-                <a:solidFill>
-                  <a:srgbClr val="89DDFF"/>
-                </a:solidFill>
-                <a:effectLst/>
-                <a:latin typeface="Arial Unicode MS"/>
-                <a:ea typeface="JetBrains Mono"/>
-              </a:rPr>
-              <a:t>= </a:t>
-            </a:r>
-            <a:r>
-              <a:rPr kumimoji="0" lang="zh-TW" altLang="zh-TW" sz="900" b="0" i="0" u="none" strike="noStrike" cap="none" normalizeH="0" baseline="0" dirty="0">
-                <a:ln>
-                  <a:noFill/>
-                </a:ln>
+              <a:t>int</a:t>
+            </a:r>
+            <a:r>
+              <a:rPr kumimoji="0" lang="zh-TW" altLang="zh-TW" sz="900" b="0" i="0" u="none" strike="noStrike" cap="none" normalizeH="0" baseline="0" dirty="0">
+                <a:ln>
+                  <a:noFill/>
+                </a:ln>
+                <a:solidFill>
+                  <a:srgbClr val="89DDFF"/>
+                </a:solidFill>
+                <a:effectLst/>
+                <a:latin typeface="Arial Unicode MS"/>
+                <a:ea typeface="JetBrains Mono"/>
+              </a:rPr>
+              <a:t>[</a:t>
+            </a:r>
+            <a:r>
+              <a:rPr lang="en-US" altLang="zh-TW" sz="900" dirty="0">
                 <a:solidFill>
                   <a:srgbClr val="EEFFFF"/>
                 </a:solidFill>
-                <a:effectLst/>
-                <a:latin typeface="Arial Unicode MS"/>
-                <a:ea typeface="JetBrains Mono"/>
-              </a:rPr>
-              <a:t>int</a:t>
-            </a:r>
-            <a:r>
-              <a:rPr kumimoji="0" lang="zh-TW" altLang="zh-TW" sz="900" b="0" i="0" u="none" strike="noStrike" cap="none" normalizeH="0" baseline="0" dirty="0">
-                <a:ln>
-                  <a:noFill/>
-                </a:ln>
-                <a:solidFill>
-                  <a:srgbClr val="89DDFF"/>
-                </a:solidFill>
-                <a:effectLst/>
-                <a:latin typeface="Arial Unicode MS"/>
-                <a:ea typeface="JetBrains Mono"/>
-              </a:rPr>
-              <a:t>[</a:t>
-            </a:r>
-            <a:r>
-              <a:rPr kumimoji="0" lang="zh-TW" altLang="zh-TW" sz="900" b="0" i="0" u="none" strike="noStrike" cap="none" normalizeH="0" baseline="0" dirty="0">
+                <a:latin typeface="Arial Unicode MS"/>
+                <a:ea typeface="JetBrains Mono"/>
+              </a:rPr>
+              <a:t>p</a:t>
+            </a:r>
+            <a:r>
+              <a:rPr kumimoji="0" lang="en-US" altLang="zh-TW" sz="900" b="0" i="0" u="none" strike="noStrike" cap="none" normalizeH="0" baseline="0" dirty="0">
                 <a:ln>
                   <a:noFill/>
                 </a:ln>
@@ -6600,35 +6578,7 @@
                 <a:latin typeface="Arial Unicode MS"/>
                 <a:ea typeface="JetBrains Mono"/>
               </a:rPr>
-              <a:t>semanticWrods</a:t>
-            </a:r>
-            <a:r>
-              <a:rPr kumimoji="0" lang="zh-TW" altLang="zh-TW" sz="900" b="0" i="0" u="none" strike="noStrike" cap="none" normalizeH="0" baseline="0" dirty="0">
-                <a:ln>
-                  <a:noFill/>
-                </a:ln>
-                <a:solidFill>
-                  <a:srgbClr val="89DDFF"/>
-                </a:solidFill>
-                <a:effectLst/>
-                <a:latin typeface="Arial Unicode MS"/>
-                <a:ea typeface="JetBrains Mono"/>
-              </a:rPr>
-              <a:t>.</a:t>
-            </a:r>
-            <a:r>
-              <a:rPr kumimoji="0" lang="zh-TW" altLang="zh-TW" sz="900" b="0" i="0" u="none" strike="noStrike" cap="none" normalizeH="0" baseline="0" dirty="0">
-                <a:ln>
-                  <a:noFill/>
-                </a:ln>
-                <a:solidFill>
-                  <a:srgbClr val="EEFFFF"/>
-                </a:solidFill>
-                <a:effectLst/>
-                <a:latin typeface="Arial Unicode MS"/>
-                <a:ea typeface="JetBrains Mono"/>
-              </a:rPr>
-              <a:t>length</a:t>
+              <a:t>ointer</a:t>
             </a:r>
             <a:r>
               <a:rPr kumimoji="0" lang="zh-TW" altLang="zh-TW" sz="900" b="0" i="0" u="none" strike="noStrike" cap="none" normalizeH="0" baseline="0" dirty="0">
@@ -15977,8 +15927,8 @@
         </p:nvSpPr>
         <p:spPr bwMode="auto">
           <a:xfrm>
-            <a:off x="198119" y="2978332"/>
-            <a:ext cx="10839995" cy="3209106"/>
+            <a:off x="172374" y="2722655"/>
+            <a:ext cx="10839995" cy="3485570"/>
           </a:xfrm>
           <a:prstGeom prst="rect">
             <a:avLst/>
@@ -16288,6 +16238,33 @@
               </a:rPr>
             </a:br>
             <a:r>
+              <a:rPr kumimoji="0" lang="en-US" altLang="zh-TW" sz="1050" b="0" i="0" u="none" strike="noStrike" cap="none" normalizeH="0" baseline="0" dirty="0">
+                <a:ln>
+                  <a:noFill/>
+                </a:ln>
+                <a:solidFill>
+                  <a:schemeClr val="tx1">
+                    <a:lumMod val="50000"/>
+                    <a:lumOff val="50000"/>
+                  </a:schemeClr>
+                </a:solidFill>
+                <a:effectLst/>
+                <a:latin typeface="Arial Unicode MS" panose="020B0604020202020204" pitchFamily="34" charset="-120"/>
+                <a:ea typeface="JetBrains Mono"/>
+              </a:rPr>
+              <a:t>// count</a:t>
+            </a:r>
+          </a:p>
+          <a:p>
+            <a:pPr lvl="0" defTabSz="914400" eaLnBrk="0" fontAlgn="base" hangingPunct="0">
+              <a:spcBef>
+                <a:spcPct val="0"/>
+              </a:spcBef>
+              <a:spcAft>
+                <a:spcPct val="0"/>
+              </a:spcAft>
+            </a:pPr>
+            <a:r>
               <a:rPr kumimoji="0" lang="zh-TW" altLang="zh-TW" sz="1050" b="0" i="1" u="none" strike="noStrike" cap="none" normalizeH="0" baseline="0" dirty="0">
                 <a:ln>
                   <a:noFill/>
@@ -17060,6 +17037,19 @@
                 <a:ea typeface="JetBrains Mono"/>
               </a:rPr>
             </a:br>
+            <a:r>
+              <a:rPr lang="en-US" altLang="zh-TW" sz="1050" dirty="0">
+                <a:solidFill>
+                  <a:schemeClr val="tx1">
+                    <a:lumMod val="50000"/>
+                    <a:lumOff val="50000"/>
+                  </a:schemeClr>
+                </a:solidFill>
+                <a:latin typeface="Arial Unicode MS" panose="020B0604020202020204" pitchFamily="34" charset="-120"/>
+                <a:ea typeface="JetBrains Mono"/>
+              </a:rPr>
+              <a:t>// sort</a:t>
+            </a:r>
             <a:br>
               <a:rPr kumimoji="0" lang="zh-TW" altLang="zh-TW" sz="1050" b="0" i="0" u="none" strike="noStrike" cap="none" normalizeH="0" baseline="0" dirty="0">
                 <a:ln>
@@ -17394,6 +17384,40 @@
                 <a:ea typeface="JetBrains Mono"/>
               </a:rPr>
             </a:br>
+            <a:r>
+              <a:rPr lang="en-US" altLang="zh-TW" sz="1050" dirty="0">
+                <a:solidFill>
+                  <a:schemeClr val="tx1">
+                    <a:lumMod val="50000"/>
+                    <a:lumOff val="50000"/>
+                  </a:schemeClr>
+                </a:solidFill>
+                <a:latin typeface="Arial Unicode MS" panose="020B0604020202020204" pitchFamily="34" charset="-120"/>
+                <a:ea typeface="JetBrains Mono"/>
+              </a:rPr>
+              <a:t>// print</a:t>
+            </a:r>
+            <a:endParaRPr kumimoji="0" lang="en-US" altLang="zh-TW" sz="1050" b="0" i="0" u="none" strike="noStrike" cap="none" normalizeH="0" baseline="0" dirty="0">
+              <a:ln>
+                <a:noFill/>
+              </a:ln>
+              <a:solidFill>
+                <a:srgbClr val="89DDFF"/>
+              </a:solidFill>
+              <a:effectLst/>
+              <a:latin typeface="Arial Unicode MS" panose="020B0604020202020204" pitchFamily="34" charset="-120"/>
+              <a:ea typeface="JetBrains Mono"/>
+            </a:endParaRPr>
+          </a:p>
+          <a:p>
+            <a:pPr lvl="0" defTabSz="914400" eaLnBrk="0" fontAlgn="base" hangingPunct="0">
+              <a:spcBef>
+                <a:spcPct val="0"/>
+              </a:spcBef>
+              <a:spcAft>
+                <a:spcPct val="0"/>
+              </a:spcAft>
+            </a:pPr>
             <a:r>
               <a:rPr kumimoji="0" lang="zh-TW" altLang="zh-TW" sz="1050" b="0" i="1" u="none" strike="noStrike" cap="none" normalizeH="0" baseline="0" dirty="0">
                 <a:ln>

</xml_diff>